<commit_message>
edit link on ppt
</commit_message>
<xml_diff>
--- a/PPT Presentasi.pptx
+++ b/PPT Presentasi.pptx
@@ -5261,15 +5261,15 @@
         </p:nvSpPr>
         <p:spPr>
           <a:xfrm>
-            <a:off x="1258924" y="4859741"/>
-            <a:ext cx="15770151" cy="615143"/>
+            <a:off x="1258925" y="4859741"/>
+            <a:ext cx="15657476" cy="1173911"/>
           </a:xfrm>
           <a:prstGeom prst="rect">
             <a:avLst/>
           </a:prstGeom>
         </p:spPr>
         <p:txBody>
-          <a:bodyPr lIns="0" tIns="0" rIns="0" bIns="0" rtlCol="0" anchor="t">
+          <a:bodyPr wrap="square" lIns="0" tIns="0" rIns="0" bIns="0" rtlCol="0" anchor="t">
             <a:spAutoFit/>
           </a:bodyPr>
           <a:lstStyle/>
@@ -5280,20 +5280,14 @@
               </a:lnSpc>
             </a:pPr>
             <a:r>
-              <a:rPr lang="en-US" sz="4374">
+              <a:rPr lang="en-US" sz="2400" dirty="0">
                 <a:solidFill>
                   <a:srgbClr val="743812"/>
                 </a:solidFill>
                 <a:latin typeface="Open Sans"/>
               </a:rPr>
-              <a:t>https://github.com/hardiantots/PBL-HomeCreditRakamin</a:t>
-            </a:r>
-            <a:endParaRPr lang="en-US" sz="4374" dirty="0">
-              <a:solidFill>
-                <a:srgbClr val="743812"/>
-              </a:solidFill>
-              <a:latin typeface="Open Sans"/>
-            </a:endParaRPr>
+              <a:t>https://github.com/arawsardni/Final-Task---Home-Credit-Scorecard-Model/blob/main/Default_Prediction_Gaung_Taqwa.ipynb</a:t>
+            </a:r>
           </a:p>
         </p:txBody>
       </p:sp>

</xml_diff>